<commit_message>
TO be changed after dry run
</commit_message>
<xml_diff>
--- a/RxSwift.pptx
+++ b/RxSwift.pptx
@@ -267,7 +267,7 @@
           <a:p>
             <a:fld id="{786D4E21-AA1D-BE49-8829-DEA10D5CF4C8}" type="datetimeFigureOut">
               <a:rPr lang="it-IT" smtClean="0"/>
-              <a:t>20/11/18</a:t>
+              <a:t>29/11/18</a:t>
             </a:fld>
             <a:endParaRPr lang="it-IT"/>
           </a:p>
@@ -433,7 +433,7 @@
           <a:p>
             <a:fld id="{23F6D68F-7DBE-1C48-BC1F-E6A07B52C7E0}" type="datetimeFigureOut">
               <a:rPr lang="it-IT" smtClean="0"/>
-              <a:t>20/11/18</a:t>
+              <a:t>29/11/18</a:t>
             </a:fld>
             <a:endParaRPr lang="it-IT"/>
           </a:p>
@@ -6656,9 +6656,7 @@
               <a:buChar char="§"/>
             </a:pPr>
             <a:r>
-              <a:rPr lang="en-US" sz="1400" b="1" kern="0" dirty="0">
-                <a:cs typeface="Proxima Nova Regular"/>
-              </a:rPr>
+              <a:rPr lang="en-US" sz="1400" kern="0" dirty="0"/>
               <a:t>filter</a:t>
             </a:r>
           </a:p>
@@ -6759,9 +6757,7 @@
               <a:buChar char="§"/>
             </a:pPr>
             <a:r>
-              <a:rPr lang="en-US" sz="1400" b="1" kern="0" dirty="0">
-                <a:cs typeface="Proxima Nova Regular"/>
-              </a:rPr>
+              <a:rPr lang="en-US" sz="1400" kern="0" dirty="0"/>
               <a:t>map</a:t>
             </a:r>
           </a:p>
@@ -6791,14 +6787,10 @@
               <a:buChar char="§"/>
             </a:pPr>
             <a:r>
-              <a:rPr lang="en-US" sz="1400" kern="0" dirty="0" err="1">
-                <a:cs typeface="Proxima Nova Regular"/>
-              </a:rPr>
+              <a:rPr lang="en-US" sz="1400" kern="0" dirty="0" err="1"/>
               <a:t>flatMap</a:t>
             </a:r>
-            <a:endParaRPr lang="en-US" sz="1400" kern="0" dirty="0">
-              <a:cs typeface="Proxima Nova Regular"/>
-            </a:endParaRPr>
+            <a:endParaRPr lang="en-US" sz="1400" kern="0" dirty="0"/>
           </a:p>
           <a:p>
             <a:pPr>
@@ -6843,14 +6835,10 @@
               <a:buChar char="§"/>
             </a:pPr>
             <a:r>
-              <a:rPr lang="de-DE" sz="1400" b="1" kern="0" dirty="0" err="1">
-                <a:cs typeface="Proxima Nova Regular"/>
-              </a:rPr>
+              <a:rPr lang="de-DE" sz="1400" kern="0" dirty="0" err="1"/>
               <a:t>combineLatest</a:t>
             </a:r>
-            <a:endParaRPr lang="de-DE" sz="1400" b="1" kern="0" dirty="0">
-              <a:cs typeface="Proxima Nova Regular"/>
-            </a:endParaRPr>
+            <a:endParaRPr lang="de-DE" sz="1400" kern="0" dirty="0"/>
           </a:p>
           <a:p>
             <a:pPr marL="285750" indent="-285750">
@@ -6971,14 +6959,10 @@
               <a:buChar char="§"/>
             </a:pPr>
             <a:r>
-              <a:rPr lang="de-DE" sz="1400" b="1" kern="0" dirty="0" err="1">
-                <a:cs typeface="Proxima Nova Regular"/>
-              </a:rPr>
+              <a:rPr lang="de-DE" sz="1400" kern="0" dirty="0" err="1"/>
               <a:t>observeOn</a:t>
             </a:r>
-            <a:endParaRPr lang="de-DE" sz="1400" b="1" kern="0" dirty="0">
-              <a:cs typeface="Proxima Nova Regular"/>
-            </a:endParaRPr>
+            <a:endParaRPr lang="de-DE" sz="1400" kern="0" dirty="0"/>
           </a:p>
           <a:p>
             <a:pPr marL="285750" indent="-285750">
@@ -11669,13 +11653,29 @@
           <a:bodyPr/>
           <a:lstStyle/>
           <a:p>
-            <a:r>
-              <a:rPr lang="it-IT" dirty="0" err="1"/>
-              <a:t>Introduction</a:t>
-            </a:r>
-            <a:r>
-              <a:rPr lang="it-IT" dirty="0"/>
-              <a:t> to </a:t>
+            <a:pPr marL="0" indent="0">
+              <a:buNone/>
+            </a:pPr>
+            <a:r>
+              <a:rPr lang="it-IT" dirty="0"/>
+              <a:t>17:30 – </a:t>
+            </a:r>
+            <a:r>
+              <a:rPr lang="it-IT" dirty="0" err="1"/>
+              <a:t>Theory</a:t>
+            </a:r>
+            <a:r>
+              <a:rPr lang="it-IT" dirty="0"/>
+              <a:t>   </a:t>
+            </a:r>
+          </a:p>
+          <a:p>
+            <a:pPr marL="0" indent="0">
+              <a:buNone/>
+            </a:pPr>
+            <a:r>
+              <a:rPr lang="it-IT" dirty="0"/>
+              <a:t> 	</a:t>
             </a:r>
             <a:r>
               <a:rPr lang="it-IT" dirty="0" err="1">
@@ -11696,13 +11696,12 @@
             <a:endParaRPr lang="it-IT" dirty="0"/>
           </a:p>
           <a:p>
-            <a:r>
-              <a:rPr lang="it-IT" dirty="0" err="1"/>
-              <a:t>Reactive</a:t>
-            </a:r>
-            <a:r>
-              <a:rPr lang="it-IT" dirty="0"/>
-              <a:t> </a:t>
+            <a:pPr marL="0" indent="0">
+              <a:buNone/>
+            </a:pPr>
+            <a:r>
+              <a:rPr lang="it-IT" dirty="0"/>
+              <a:t>	</a:t>
             </a:r>
             <a:r>
               <a:rPr lang="it-IT" dirty="0" err="1"/>
@@ -11711,29 +11710,71 @@
             <a:endParaRPr lang="it-IT" dirty="0"/>
           </a:p>
           <a:p>
-            <a:r>
-              <a:rPr lang="it-IT" dirty="0"/>
-              <a:t>Code </a:t>
+            <a:pPr marL="0" indent="0">
+              <a:buNone/>
+            </a:pPr>
+            <a:r>
+              <a:rPr lang="it-IT" dirty="0"/>
+              <a:t>	Code </a:t>
             </a:r>
             <a:r>
               <a:rPr lang="it-IT" dirty="0" err="1"/>
               <a:t>Snippets</a:t>
             </a:r>
+            <a:r>
+              <a:rPr lang="it-IT" dirty="0"/>
+              <a:t>	</a:t>
+            </a:r>
+          </a:p>
+          <a:p>
+            <a:pPr marL="0" indent="0">
+              <a:buNone/>
+            </a:pPr>
+            <a:r>
+              <a:rPr lang="it-IT" dirty="0"/>
+              <a:t>	</a:t>
+            </a:r>
+            <a:r>
+              <a:rPr lang="it-IT" dirty="0" err="1"/>
+              <a:t>Contacts</a:t>
+            </a:r>
+            <a:r>
+              <a:rPr lang="it-IT" dirty="0"/>
+              <a:t> &amp; </a:t>
+            </a:r>
+            <a:r>
+              <a:rPr lang="it-IT" dirty="0" err="1"/>
+              <a:t>Resources</a:t>
+            </a:r>
             <a:endParaRPr lang="it-IT" dirty="0"/>
           </a:p>
           <a:p>
-            <a:r>
-              <a:rPr lang="it-IT" dirty="0" err="1"/>
-              <a:t>Contacts</a:t>
-            </a:r>
-            <a:r>
-              <a:rPr lang="it-IT" dirty="0"/>
-              <a:t> &amp; </a:t>
-            </a:r>
-            <a:r>
-              <a:rPr lang="it-IT" dirty="0" err="1"/>
-              <a:t>Resources</a:t>
-            </a:r>
+            <a:pPr marL="0" indent="0">
+              <a:buNone/>
+            </a:pPr>
+            <a:r>
+              <a:rPr lang="it-IT" dirty="0"/>
+              <a:t>18:00 – </a:t>
+            </a:r>
+            <a:r>
+              <a:rPr lang="it-IT" dirty="0" err="1"/>
+              <a:t>Hands-on</a:t>
+            </a:r>
+            <a:endParaRPr lang="it-IT" dirty="0"/>
+          </a:p>
+          <a:p>
+            <a:pPr marL="0" indent="0">
+              <a:buNone/>
+            </a:pPr>
+            <a:r>
+              <a:rPr lang="it-IT" dirty="0"/>
+              <a:t>19:45 – Happy hour</a:t>
+            </a:r>
+          </a:p>
+          <a:p>
+            <a:pPr marL="0" indent="0">
+              <a:buNone/>
+            </a:pPr>
             <a:endParaRPr lang="it-IT" dirty="0"/>
           </a:p>
         </p:txBody>
@@ -12429,14 +12470,14 @@
           </a:ln>
           <a:extLst>
             <a:ext uri="{909E8E84-426E-40dd-AFC4-6F175D3DCCD1}">
-              <a14:hiddenFill xmlns="" xmlns:a14="http://schemas.microsoft.com/office/drawing/2010/main">
+              <a14:hiddenFill xmlns:a14="http://schemas.microsoft.com/office/drawing/2010/main" xmlns="">
                 <a:solidFill>
                   <a:srgbClr val="FFFFFF"/>
                 </a:solidFill>
               </a14:hiddenFill>
             </a:ext>
             <a:ext uri="{91240B29-F687-4f45-9708-019B960494DF}">
-              <a14:hiddenLine xmlns="" xmlns:a14="http://schemas.microsoft.com/office/drawing/2010/main" w="9525">
+              <a14:hiddenLine xmlns:a14="http://schemas.microsoft.com/office/drawing/2010/main" xmlns="" w="9525">
                 <a:solidFill>
                   <a:srgbClr val="000000"/>
                 </a:solidFill>

</xml_diff>